<commit_message>
Modifikasi fitur generate PPT
</commit_message>
<xml_diff>
--- a/output/output.pptx
+++ b/output/output.pptx
@@ -7490,7 +7490,7 @@
           <a:p>
             <a:r>
               <a:rPr sz="800" i="1"/>
-              <a:t>Generated by AI Automation - Python | 2025-04-24</a:t>
+              <a:t>Generated by AI Automation - Python | 2025-04-25</a:t>
             </a:r>
           </a:p>
         </p:txBody>
@@ -7789,7 +7789,7 @@
           <a:p>
             <a:r>
               <a:rPr sz="800" i="1"/>
-              <a:t>Generated by AI Automation - Python | 2025-04-24</a:t>
+              <a:t>Generated by AI Automation - Python | 2025-04-25</a:t>
             </a:r>
           </a:p>
         </p:txBody>
@@ -8030,7 +8030,7 @@
           <a:p>
             <a:r>
               <a:rPr sz="800" i="1"/>
-              <a:t>Generated by AI Automation - Python | 2025-04-24</a:t>
+              <a:t>Generated by AI Automation - Python | 2025-04-25</a:t>
             </a:r>
           </a:p>
         </p:txBody>
@@ -8132,7 +8132,7 @@
           <a:p>
             <a:r>
               <a:rPr sz="800" i="1"/>
-              <a:t>Generated by AI Automation - Python | 2025-04-24</a:t>
+              <a:t>Generated by AI Automation - Python | 2025-04-25</a:t>
             </a:r>
           </a:p>
         </p:txBody>
@@ -8250,7 +8250,7 @@
           <a:p>
             <a:r>
               <a:rPr sz="800" i="1"/>
-              <a:t>Generated by AI Automation - Python | 2025-04-24</a:t>
+              <a:t>Generated by AI Automation - Python | 2025-04-25</a:t>
             </a:r>
           </a:p>
         </p:txBody>
@@ -9288,7 +9288,7 @@
           <a:p>
             <a:r>
               <a:rPr sz="800" i="1"/>
-              <a:t>Generated by AI Automation - Python | 2025-04-24</a:t>
+              <a:t>Generated by AI Automation - Python | 2025-04-25</a:t>
             </a:r>
           </a:p>
         </p:txBody>
@@ -9890,7 +9890,7 @@
           <a:p>
             <a:r>
               <a:rPr sz="800" i="1"/>
-              <a:t>Generated by AI Automation - Python | 2025-04-24</a:t>
+              <a:t>Generated by AI Automation - Python | 2025-04-25</a:t>
             </a:r>
           </a:p>
         </p:txBody>
@@ -10233,7 +10233,7 @@
           <a:p>
             <a:r>
               <a:rPr sz="800" i="1"/>
-              <a:t>Generated by AI Automation - Python | 2025-04-24</a:t>
+              <a:t>Generated by AI Automation - Python | 2025-04-25</a:t>
             </a:r>
           </a:p>
         </p:txBody>
@@ -10524,7 +10524,7 @@
           <a:p>
             <a:r>
               <a:rPr sz="800" i="1"/>
-              <a:t>Generated by AI Automation - Python | 2025-04-24</a:t>
+              <a:t>Generated by AI Automation - Python | 2025-04-25</a:t>
             </a:r>
           </a:p>
         </p:txBody>
@@ -10765,7 +10765,7 @@
           <a:p>
             <a:r>
               <a:rPr sz="800" i="1"/>
-              <a:t>Generated by AI Automation - Python | 2025-04-24</a:t>
+              <a:t>Generated by AI Automation - Python | 2025-04-25</a:t>
             </a:r>
           </a:p>
         </p:txBody>
@@ -10971,7 +10971,7 @@
           <a:p>
             <a:r>
               <a:rPr sz="800" i="1"/>
-              <a:t>Generated by AI Automation - Python | 2025-04-24</a:t>
+              <a:t>Generated by AI Automation - Python | 2025-04-25</a:t>
             </a:r>
           </a:p>
         </p:txBody>
@@ -11455,7 +11455,7 @@
           <a:p>
             <a:r>
               <a:rPr sz="800" i="1"/>
-              <a:t>Generated by AI Automation - Python | 2025-04-24</a:t>
+              <a:t>Generated by AI Automation - Python | 2025-04-25</a:t>
             </a:r>
           </a:p>
         </p:txBody>
@@ -11584,7 +11584,7 @@
           <a:p>
             <a:r>
               <a:rPr sz="800" i="1"/>
-              <a:t>Generated by AI Automation - Python | 2025-04-24</a:t>
+              <a:t>Generated by AI Automation - Python | 2025-04-25</a:t>
             </a:r>
           </a:p>
         </p:txBody>
@@ -11929,7 +11929,7 @@
           <a:p>
             <a:r>
               <a:rPr sz="800" i="1"/>
-              <a:t>Generated by AI Automation - Python | 2025-04-24</a:t>
+              <a:t>Generated by AI Automation - Python | 2025-04-25</a:t>
             </a:r>
           </a:p>
         </p:txBody>
@@ -12185,7 +12185,7 @@
           <a:p>
             <a:r>
               <a:rPr sz="800" i="1"/>
-              <a:t>Generated by AI Automation - Python | 2025-04-24</a:t>
+              <a:t>Generated by AI Automation - Python | 2025-04-25</a:t>
             </a:r>
           </a:p>
         </p:txBody>
@@ -12322,7 +12322,7 @@
           <a:p>
             <a:r>
               <a:rPr sz="800" i="1"/>
-              <a:t>Generated by AI Automation - Python | 2025-04-24</a:t>
+              <a:t>Generated by AI Automation - Python | 2025-04-25</a:t>
             </a:r>
           </a:p>
         </p:txBody>
@@ -12440,7 +12440,7 @@
           <a:p>
             <a:r>
               <a:rPr sz="800" i="1"/>
-              <a:t>Generated by AI Automation - Python | 2025-04-24</a:t>
+              <a:t>Generated by AI Automation - Python | 2025-04-25</a:t>
             </a:r>
           </a:p>
         </p:txBody>
@@ -13486,7 +13486,7 @@
           <a:p>
             <a:r>
               <a:rPr sz="800" i="1"/>
-              <a:t>Generated by AI Automation - Python | 2025-04-24</a:t>
+              <a:t>Generated by AI Automation - Python | 2025-04-25</a:t>
             </a:r>
           </a:p>
         </p:txBody>
@@ -14088,7 +14088,7 @@
           <a:p>
             <a:r>
               <a:rPr sz="800" i="1"/>
-              <a:t>Generated by AI Automation - Python | 2025-04-24</a:t>
+              <a:t>Generated by AI Automation - Python | 2025-04-25</a:t>
             </a:r>
           </a:p>
         </p:txBody>
@@ -14431,7 +14431,7 @@
           <a:p>
             <a:r>
               <a:rPr sz="800" i="1"/>
-              <a:t>Generated by AI Automation - Python | 2025-04-24</a:t>
+              <a:t>Generated by AI Automation - Python | 2025-04-25</a:t>
             </a:r>
           </a:p>
         </p:txBody>

</xml_diff>